<commit_message>
Edits to the paper and pictures.
</commit_message>
<xml_diff>
--- a/journalWallFriction/pictures/pdf/FirstPicLeft.pptx
+++ b/journalWallFriction/pictures/pdf/FirstPicLeft.pptx
@@ -2966,6 +2966,36 @@
           <a:chExt cx="0" cy="0"/>
         </a:xfrm>
       </p:grpSpPr>
+      <p:pic>
+        <p:nvPicPr>
+          <p:cNvPr id="44" name="Picture 43">
+            <a:extLst>
+              <a:ext uri="{FF2B5EF4-FFF2-40B4-BE49-F238E27FC236}">
+                <a16:creationId xmlns:a16="http://schemas.microsoft.com/office/drawing/2014/main" id="{B45DB28D-0C91-0649-B08A-AB97AE650144}"/>
+              </a:ext>
+            </a:extLst>
+          </p:cNvPr>
+          <p:cNvPicPr>
+            <a:picLocks noChangeAspect="1"/>
+          </p:cNvPicPr>
+          <p:nvPr/>
+        </p:nvPicPr>
+        <p:blipFill>
+          <a:blip r:embed="rId2"/>
+          <a:stretch>
+            <a:fillRect/>
+          </a:stretch>
+        </p:blipFill>
+        <p:spPr>
+          <a:xfrm>
+            <a:off x="0" y="7155"/>
+            <a:ext cx="2286000" cy="2271690"/>
+          </a:xfrm>
+          <a:prstGeom prst="rect">
+            <a:avLst/>
+          </a:prstGeom>
+        </p:spPr>
+      </p:pic>
       <p:grpSp>
         <p:nvGrpSpPr>
           <p:cNvPr id="30" name="Group 29">
@@ -2980,42 +3010,12 @@
         </p:nvGrpSpPr>
         <p:grpSpPr>
           <a:xfrm>
-            <a:off x="-215721" y="51515"/>
-            <a:ext cx="2517904" cy="2178492"/>
-            <a:chOff x="-282077" y="0"/>
-            <a:chExt cx="2195509" cy="1828800"/>
+            <a:off x="6492" y="313025"/>
+            <a:ext cx="2279508" cy="1792117"/>
+            <a:chOff x="-88316" y="219532"/>
+            <a:chExt cx="1987637" cy="1504446"/>
           </a:xfrm>
         </p:grpSpPr>
-        <p:pic>
-          <p:nvPicPr>
-            <p:cNvPr id="31" name="Picture 30">
-              <a:extLst>
-                <a:ext uri="{FF2B5EF4-FFF2-40B4-BE49-F238E27FC236}">
-                  <a16:creationId xmlns:a16="http://schemas.microsoft.com/office/drawing/2014/main" id="{B44D7FC9-856D-F24F-B568-84D09EB0B5BC}"/>
-                </a:ext>
-              </a:extLst>
-            </p:cNvPr>
-            <p:cNvPicPr>
-              <a:picLocks noChangeAspect="1"/>
-            </p:cNvPicPr>
-            <p:nvPr/>
-          </p:nvPicPr>
-          <p:blipFill>
-            <a:blip r:embed="rId2"/>
-            <a:stretch>
-              <a:fillRect/>
-            </a:stretch>
-          </p:blipFill>
-          <p:spPr>
-            <a:xfrm>
-              <a:off x="-7042" y="0"/>
-              <a:ext cx="1850604" cy="1828800"/>
-            </a:xfrm>
-            <a:prstGeom prst="rect">
-              <a:avLst/>
-            </a:prstGeom>
-          </p:spPr>
-        </p:pic>
         <p:cxnSp>
           <p:nvCxnSpPr>
             <p:cNvPr id="32" name="Straight Arrow Connector 31">
@@ -3030,7 +3030,7 @@
           </p:nvCxnSpPr>
           <p:spPr>
             <a:xfrm>
-              <a:off x="918260" y="601133"/>
+              <a:off x="848075" y="565994"/>
               <a:ext cx="0" cy="186267"/>
             </a:xfrm>
             <a:prstGeom prst="straightConnector1">
@@ -3073,7 +3073,7 @@
           </p:nvCxnSpPr>
           <p:spPr>
             <a:xfrm>
-              <a:off x="791260" y="1464733"/>
+              <a:off x="889521" y="1537711"/>
               <a:ext cx="0" cy="186267"/>
             </a:xfrm>
             <a:prstGeom prst="straightConnector1">
@@ -3116,7 +3116,7 @@
           </p:nvSpPr>
           <p:spPr>
             <a:xfrm>
-              <a:off x="93124" y="1005301"/>
+              <a:off x="138044" y="1108570"/>
               <a:ext cx="825136" cy="278538"/>
             </a:xfrm>
             <a:prstGeom prst="rect">
@@ -3287,7 +3287,7 @@
           </p:nvSpPr>
           <p:spPr>
             <a:xfrm>
-              <a:off x="1088296" y="706236"/>
+              <a:off x="1074185" y="659127"/>
               <a:ext cx="825136" cy="278538"/>
             </a:xfrm>
             <a:prstGeom prst="rect">
@@ -3350,8 +3350,8 @@
           </p:nvCxnSpPr>
           <p:spPr>
             <a:xfrm flipV="1">
-              <a:off x="675728" y="599581"/>
-              <a:ext cx="242532" cy="106655"/>
+              <a:off x="675728" y="565994"/>
+              <a:ext cx="145574" cy="140243"/>
             </a:xfrm>
             <a:prstGeom prst="straightConnector1">
               <a:avLst/>
@@ -3395,7 +3395,7 @@
           <p:spPr>
             <a:xfrm>
               <a:off x="675728" y="706535"/>
-              <a:ext cx="87963" cy="711501"/>
+              <a:ext cx="192033" cy="804070"/>
             </a:xfrm>
             <a:prstGeom prst="straightConnector1">
               <a:avLst/>
@@ -3436,8 +3436,8 @@
           </p:nvSpPr>
           <p:spPr>
             <a:xfrm>
-              <a:off x="-282077" y="500488"/>
-              <a:ext cx="1406539" cy="387558"/>
+              <a:off x="-88316" y="518060"/>
+              <a:ext cx="909618" cy="387558"/>
             </a:xfrm>
             <a:prstGeom prst="rect">
               <a:avLst/>

</xml_diff>

<commit_message>
Added tons of new images!
</commit_message>
<xml_diff>
--- a/journalWallFriction/pictures/pdf/FirstPicLeft.pptx
+++ b/journalWallFriction/pictures/pdf/FirstPicLeft.pptx
@@ -104,6 +104,11 @@
       </a:defRPr>
     </a:lvl9pPr>
   </p:defaultTextStyle>
+  <p:extLst>
+    <p:ext uri="{EFAFB233-063F-42B5-8137-9DF3F51BA10A}">
+      <p15:sldGuideLst xmlns:p15="http://schemas.microsoft.com/office/powerpoint/2012/main"/>
+    </p:ext>
+  </p:extLst>
 </p:presentation>
 </file>
 
@@ -238,7 +243,7 @@
           <a:p>
             <a:fld id="{B5AAD016-3922-B245-A041-AC660975EDB6}" type="datetimeFigureOut">
               <a:rPr lang="en-US" smtClean="0"/>
-              <a:t>4/12/18</a:t>
+              <a:t>4/24/18</a:t>
             </a:fld>
             <a:endParaRPr lang="en-US"/>
           </a:p>
@@ -408,7 +413,7 @@
           <a:p>
             <a:fld id="{B5AAD016-3922-B245-A041-AC660975EDB6}" type="datetimeFigureOut">
               <a:rPr lang="en-US" smtClean="0"/>
-              <a:t>4/12/18</a:t>
+              <a:t>4/24/18</a:t>
             </a:fld>
             <a:endParaRPr lang="en-US"/>
           </a:p>
@@ -588,7 +593,7 @@
           <a:p>
             <a:fld id="{B5AAD016-3922-B245-A041-AC660975EDB6}" type="datetimeFigureOut">
               <a:rPr lang="en-US" smtClean="0"/>
-              <a:t>4/12/18</a:t>
+              <a:t>4/24/18</a:t>
             </a:fld>
             <a:endParaRPr lang="en-US"/>
           </a:p>
@@ -758,7 +763,7 @@
           <a:p>
             <a:fld id="{B5AAD016-3922-B245-A041-AC660975EDB6}" type="datetimeFigureOut">
               <a:rPr lang="en-US" smtClean="0"/>
-              <a:t>4/12/18</a:t>
+              <a:t>4/24/18</a:t>
             </a:fld>
             <a:endParaRPr lang="en-US"/>
           </a:p>
@@ -1002,7 +1007,7 @@
           <a:p>
             <a:fld id="{B5AAD016-3922-B245-A041-AC660975EDB6}" type="datetimeFigureOut">
               <a:rPr lang="en-US" smtClean="0"/>
-              <a:t>4/12/18</a:t>
+              <a:t>4/24/18</a:t>
             </a:fld>
             <a:endParaRPr lang="en-US"/>
           </a:p>
@@ -1234,7 +1239,7 @@
           <a:p>
             <a:fld id="{B5AAD016-3922-B245-A041-AC660975EDB6}" type="datetimeFigureOut">
               <a:rPr lang="en-US" smtClean="0"/>
-              <a:t>4/12/18</a:t>
+              <a:t>4/24/18</a:t>
             </a:fld>
             <a:endParaRPr lang="en-US"/>
           </a:p>
@@ -1601,7 +1606,7 @@
           <a:p>
             <a:fld id="{B5AAD016-3922-B245-A041-AC660975EDB6}" type="datetimeFigureOut">
               <a:rPr lang="en-US" smtClean="0"/>
-              <a:t>4/12/18</a:t>
+              <a:t>4/24/18</a:t>
             </a:fld>
             <a:endParaRPr lang="en-US"/>
           </a:p>
@@ -1719,7 +1724,7 @@
           <a:p>
             <a:fld id="{B5AAD016-3922-B245-A041-AC660975EDB6}" type="datetimeFigureOut">
               <a:rPr lang="en-US" smtClean="0"/>
-              <a:t>4/12/18</a:t>
+              <a:t>4/24/18</a:t>
             </a:fld>
             <a:endParaRPr lang="en-US"/>
           </a:p>
@@ -1814,7 +1819,7 @@
           <a:p>
             <a:fld id="{B5AAD016-3922-B245-A041-AC660975EDB6}" type="datetimeFigureOut">
               <a:rPr lang="en-US" smtClean="0"/>
-              <a:t>4/12/18</a:t>
+              <a:t>4/24/18</a:t>
             </a:fld>
             <a:endParaRPr lang="en-US"/>
           </a:p>
@@ -2091,7 +2096,7 @@
           <a:p>
             <a:fld id="{B5AAD016-3922-B245-A041-AC660975EDB6}" type="datetimeFigureOut">
               <a:rPr lang="en-US" smtClean="0"/>
-              <a:t>4/12/18</a:t>
+              <a:t>4/24/18</a:t>
             </a:fld>
             <a:endParaRPr lang="en-US"/>
           </a:p>
@@ -2348,7 +2353,7 @@
           <a:p>
             <a:fld id="{B5AAD016-3922-B245-A041-AC660975EDB6}" type="datetimeFigureOut">
               <a:rPr lang="en-US" smtClean="0"/>
-              <a:t>4/12/18</a:t>
+              <a:t>4/24/18</a:t>
             </a:fld>
             <a:endParaRPr lang="en-US"/>
           </a:p>
@@ -2561,7 +2566,7 @@
           <a:p>
             <a:fld id="{B5AAD016-3922-B245-A041-AC660975EDB6}" type="datetimeFigureOut">
               <a:rPr lang="en-US" smtClean="0"/>
-              <a:t>4/12/18</a:t>
+              <a:t>4/24/18</a:t>
             </a:fld>
             <a:endParaRPr lang="en-US"/>
           </a:p>
@@ -2968,10 +2973,10 @@
       </p:grpSpPr>
       <p:pic>
         <p:nvPicPr>
-          <p:cNvPr id="44" name="Picture 43">
+          <p:cNvPr id="3" name="Picture 2">
             <a:extLst>
               <a:ext uri="{FF2B5EF4-FFF2-40B4-BE49-F238E27FC236}">
-                <a16:creationId xmlns:a16="http://schemas.microsoft.com/office/drawing/2014/main" id="{B45DB28D-0C91-0649-B08A-AB97AE650144}"/>
+                <a16:creationId xmlns:a16="http://schemas.microsoft.com/office/drawing/2014/main" id="{38BE596D-6786-A84E-93F1-F4D7C906C923}"/>
               </a:ext>
             </a:extLst>
           </p:cNvPr>
@@ -2988,8 +2993,8 @@
         </p:blipFill>
         <p:spPr>
           <a:xfrm>
-            <a:off x="0" y="7155"/>
-            <a:ext cx="2286000" cy="2271690"/>
+            <a:off x="0" y="0"/>
+            <a:ext cx="2286000" cy="2286000"/>
           </a:xfrm>
           <a:prstGeom prst="rect">
             <a:avLst/>
@@ -3010,10 +3015,10 @@
         </p:nvGrpSpPr>
         <p:grpSpPr>
           <a:xfrm>
-            <a:off x="6492" y="313025"/>
-            <a:ext cx="2279508" cy="1792117"/>
-            <a:chOff x="-88316" y="219532"/>
-            <a:chExt cx="1987637" cy="1504446"/>
+            <a:off x="1002505" y="398020"/>
+            <a:ext cx="1106425" cy="1695775"/>
+            <a:chOff x="780168" y="346360"/>
+            <a:chExt cx="964757" cy="1423567"/>
           </a:xfrm>
         </p:grpSpPr>
         <p:cxnSp>
@@ -3030,7 +3035,7 @@
           </p:nvCxnSpPr>
           <p:spPr>
             <a:xfrm>
-              <a:off x="848075" y="565994"/>
+              <a:off x="780168" y="605293"/>
               <a:ext cx="0" cy="186267"/>
             </a:xfrm>
             <a:prstGeom prst="straightConnector1">
@@ -3073,7 +3078,7 @@
           </p:nvCxnSpPr>
           <p:spPr>
             <a:xfrm>
-              <a:off x="889521" y="1537711"/>
+              <a:off x="937250" y="1583660"/>
               <a:ext cx="0" cy="186267"/>
             </a:xfrm>
             <a:prstGeom prst="straightConnector1">
@@ -3102,238 +3107,6 @@
             </a:fontRef>
           </p:style>
         </p:cxnSp>
-        <p:sp>
-          <p:nvSpPr>
-            <p:cNvPr id="34" name="TextBox 33">
-              <a:extLst>
-                <a:ext uri="{FF2B5EF4-FFF2-40B4-BE49-F238E27FC236}">
-                  <a16:creationId xmlns:a16="http://schemas.microsoft.com/office/drawing/2014/main" id="{E34CF0C5-1296-A644-8A33-D1DCACAFC7C0}"/>
-                </a:ext>
-              </a:extLst>
-            </p:cNvPr>
-            <p:cNvSpPr txBox="1"/>
-            <p:nvPr/>
-          </p:nvSpPr>
-          <p:spPr>
-            <a:xfrm>
-              <a:off x="138044" y="1108570"/>
-              <a:ext cx="825136" cy="278538"/>
-            </a:xfrm>
-            <a:prstGeom prst="rect">
-              <a:avLst/>
-            </a:prstGeom>
-            <a:noFill/>
-          </p:spPr>
-          <p:txBody>
-            <a:bodyPr wrap="square" rtlCol="0">
-              <a:spAutoFit/>
-            </a:bodyPr>
-            <a:lstStyle/>
-            <a:p>
-              <a:r>
-                <a:rPr lang="en-US" sz="1500" dirty="0">
-                  <a:solidFill>
-                    <a:schemeClr val="accent6">
-                      <a:lumMod val="50000"/>
-                    </a:schemeClr>
-                  </a:solidFill>
-                </a:rPr>
-                <a:t>P</a:t>
-              </a:r>
-              <a:r>
-                <a:rPr lang="en-US" sz="1500" baseline="-25000" dirty="0">
-                  <a:solidFill>
-                    <a:schemeClr val="accent6">
-                      <a:lumMod val="50000"/>
-                    </a:schemeClr>
-                  </a:solidFill>
-                </a:rPr>
-                <a:t>1</a:t>
-              </a:r>
-              <a:r>
-                <a:rPr lang="en-US" sz="1500" dirty="0">
-                  <a:solidFill>
-                    <a:schemeClr val="accent6">
-                      <a:lumMod val="50000"/>
-                    </a:schemeClr>
-                  </a:solidFill>
-                </a:rPr>
-                <a:t> Goal</a:t>
-              </a:r>
-            </a:p>
-          </p:txBody>
-        </p:sp>
-        <p:sp>
-          <p:nvSpPr>
-            <p:cNvPr id="35" name="TextBox 34">
-              <a:extLst>
-                <a:ext uri="{FF2B5EF4-FFF2-40B4-BE49-F238E27FC236}">
-                  <a16:creationId xmlns:a16="http://schemas.microsoft.com/office/drawing/2014/main" id="{F1C58096-8246-2A43-B983-668AD6E740C0}"/>
-                </a:ext>
-              </a:extLst>
-            </p:cNvPr>
-            <p:cNvSpPr txBox="1"/>
-            <p:nvPr/>
-          </p:nvSpPr>
-          <p:spPr>
-            <a:xfrm>
-              <a:off x="774579" y="319918"/>
-              <a:ext cx="825136" cy="278538"/>
-            </a:xfrm>
-            <a:prstGeom prst="rect">
-              <a:avLst/>
-            </a:prstGeom>
-            <a:noFill/>
-          </p:spPr>
-          <p:txBody>
-            <a:bodyPr wrap="square" rtlCol="0">
-              <a:spAutoFit/>
-            </a:bodyPr>
-            <a:lstStyle/>
-            <a:p>
-              <a:r>
-                <a:rPr lang="en-US" sz="1500" dirty="0">
-                  <a:solidFill>
-                    <a:srgbClr val="FF0000"/>
-                  </a:solidFill>
-                </a:rPr>
-                <a:t>P</a:t>
-              </a:r>
-              <a:r>
-                <a:rPr lang="en-US" sz="1500" baseline="-25000" dirty="0">
-                  <a:solidFill>
-                    <a:srgbClr val="FF0000"/>
-                  </a:solidFill>
-                </a:rPr>
-                <a:t>1</a:t>
-              </a:r>
-              <a:r>
-                <a:rPr lang="en-US" sz="1500" dirty="0">
-                  <a:solidFill>
-                    <a:srgbClr val="FF0000"/>
-                  </a:solidFill>
-                </a:rPr>
-                <a:t> Start</a:t>
-              </a:r>
-            </a:p>
-          </p:txBody>
-        </p:sp>
-        <p:sp>
-          <p:nvSpPr>
-            <p:cNvPr id="36" name="TextBox 35">
-              <a:extLst>
-                <a:ext uri="{FF2B5EF4-FFF2-40B4-BE49-F238E27FC236}">
-                  <a16:creationId xmlns:a16="http://schemas.microsoft.com/office/drawing/2014/main" id="{72ACD53A-091D-7D41-8D4D-B1CC2B47AAC9}"/>
-                </a:ext>
-              </a:extLst>
-            </p:cNvPr>
-            <p:cNvSpPr txBox="1"/>
-            <p:nvPr/>
-          </p:nvSpPr>
-          <p:spPr>
-            <a:xfrm>
-              <a:off x="737815" y="1232068"/>
-              <a:ext cx="825136" cy="278538"/>
-            </a:xfrm>
-            <a:prstGeom prst="rect">
-              <a:avLst/>
-            </a:prstGeom>
-            <a:noFill/>
-          </p:spPr>
-          <p:txBody>
-            <a:bodyPr wrap="square" rtlCol="0">
-              <a:spAutoFit/>
-            </a:bodyPr>
-            <a:lstStyle/>
-            <a:p>
-              <a:r>
-                <a:rPr lang="en-US" sz="1500" dirty="0">
-                  <a:solidFill>
-                    <a:srgbClr val="FF0000"/>
-                  </a:solidFill>
-                </a:rPr>
-                <a:t>P</a:t>
-              </a:r>
-              <a:r>
-                <a:rPr lang="en-US" sz="1500" baseline="-25000" dirty="0">
-                  <a:solidFill>
-                    <a:srgbClr val="FF0000"/>
-                  </a:solidFill>
-                </a:rPr>
-                <a:t>2</a:t>
-              </a:r>
-              <a:r>
-                <a:rPr lang="en-US" sz="1500" dirty="0">
-                  <a:solidFill>
-                    <a:srgbClr val="FF0000"/>
-                  </a:solidFill>
-                </a:rPr>
-                <a:t> Start</a:t>
-              </a:r>
-            </a:p>
-          </p:txBody>
-        </p:sp>
-        <p:sp>
-          <p:nvSpPr>
-            <p:cNvPr id="37" name="TextBox 36">
-              <a:extLst>
-                <a:ext uri="{FF2B5EF4-FFF2-40B4-BE49-F238E27FC236}">
-                  <a16:creationId xmlns:a16="http://schemas.microsoft.com/office/drawing/2014/main" id="{AF111820-6D10-4545-8A3B-FB994755DE2B}"/>
-                </a:ext>
-              </a:extLst>
-            </p:cNvPr>
-            <p:cNvSpPr txBox="1"/>
-            <p:nvPr/>
-          </p:nvSpPr>
-          <p:spPr>
-            <a:xfrm>
-              <a:off x="1074185" y="659127"/>
-              <a:ext cx="825136" cy="278538"/>
-            </a:xfrm>
-            <a:prstGeom prst="rect">
-              <a:avLst/>
-            </a:prstGeom>
-            <a:noFill/>
-          </p:spPr>
-          <p:txBody>
-            <a:bodyPr wrap="square" rtlCol="0">
-              <a:spAutoFit/>
-            </a:bodyPr>
-            <a:lstStyle/>
-            <a:p>
-              <a:r>
-                <a:rPr lang="en-US" sz="1500" dirty="0">
-                  <a:solidFill>
-                    <a:schemeClr val="accent6">
-                      <a:lumMod val="50000"/>
-                    </a:schemeClr>
-                  </a:solidFill>
-                </a:rPr>
-                <a:t>P</a:t>
-              </a:r>
-              <a:r>
-                <a:rPr lang="en-US" sz="1500" baseline="-25000" dirty="0">
-                  <a:solidFill>
-                    <a:schemeClr val="accent6">
-                      <a:lumMod val="50000"/>
-                    </a:schemeClr>
-                  </a:solidFill>
-                </a:rPr>
-                <a:t>2</a:t>
-              </a:r>
-              <a:r>
-                <a:rPr lang="en-US" sz="1500" dirty="0">
-                  <a:solidFill>
-                    <a:schemeClr val="accent6">
-                      <a:lumMod val="50000"/>
-                    </a:schemeClr>
-                  </a:solidFill>
-                </a:rPr>
-                <a:t> Goal</a:t>
-              </a:r>
-            </a:p>
-          </p:txBody>
-        </p:sp>
         <p:cxnSp>
           <p:nvCxnSpPr>
             <p:cNvPr id="38" name="Straight Arrow Connector 37">
@@ -3349,9 +3122,9 @@
             <p:nvPr/>
           </p:nvCxnSpPr>
           <p:spPr>
-            <a:xfrm flipV="1">
-              <a:off x="675728" y="565994"/>
-              <a:ext cx="145574" cy="140243"/>
+            <a:xfrm flipH="1" flipV="1">
+              <a:off x="817515" y="578894"/>
+              <a:ext cx="222723" cy="656328"/>
             </a:xfrm>
             <a:prstGeom prst="straightConnector1">
               <a:avLst/>
@@ -3393,9 +3166,9 @@
             <p:nvPr/>
           </p:nvCxnSpPr>
           <p:spPr>
-            <a:xfrm>
-              <a:off x="675728" y="706535"/>
-              <a:ext cx="192033" cy="804070"/>
+            <a:xfrm flipH="1">
+              <a:off x="937250" y="1235222"/>
+              <a:ext cx="102988" cy="296271"/>
             </a:xfrm>
             <a:prstGeom prst="straightConnector1">
               <a:avLst/>
@@ -3436,7 +3209,7 @@
           </p:nvSpPr>
           <p:spPr>
             <a:xfrm>
-              <a:off x="-88316" y="518060"/>
+              <a:off x="835307" y="1093609"/>
               <a:ext cx="909618" cy="387558"/>
             </a:xfrm>
             <a:prstGeom prst="rect">
@@ -3505,7 +3278,7 @@
           </p:nvCxnSpPr>
           <p:spPr>
             <a:xfrm>
-              <a:off x="399894" y="428026"/>
+              <a:off x="1199655" y="533439"/>
               <a:ext cx="180923" cy="0"/>
             </a:xfrm>
             <a:prstGeom prst="line">
@@ -3549,7 +3322,7 @@
           </p:nvSpPr>
           <p:spPr>
             <a:xfrm>
-              <a:off x="226154" y="219532"/>
+              <a:off x="1040238" y="346360"/>
               <a:ext cx="609154" cy="232535"/>
             </a:xfrm>
             <a:prstGeom prst="rect">

</xml_diff>

<commit_message>
A lot of the pictures have been changed!
</commit_message>
<xml_diff>
--- a/journalWallFriction/pictures/pdf/FirstPicLeft.pptx
+++ b/journalWallFriction/pictures/pdf/FirstPicLeft.pptx
@@ -243,7 +243,7 @@
           <a:p>
             <a:fld id="{B5AAD016-3922-B245-A041-AC660975EDB6}" type="datetimeFigureOut">
               <a:rPr lang="en-US" smtClean="0"/>
-              <a:t>4/24/18</a:t>
+              <a:t>5/1/18</a:t>
             </a:fld>
             <a:endParaRPr lang="en-US"/>
           </a:p>
@@ -413,7 +413,7 @@
           <a:p>
             <a:fld id="{B5AAD016-3922-B245-A041-AC660975EDB6}" type="datetimeFigureOut">
               <a:rPr lang="en-US" smtClean="0"/>
-              <a:t>4/24/18</a:t>
+              <a:t>5/1/18</a:t>
             </a:fld>
             <a:endParaRPr lang="en-US"/>
           </a:p>
@@ -593,7 +593,7 @@
           <a:p>
             <a:fld id="{B5AAD016-3922-B245-A041-AC660975EDB6}" type="datetimeFigureOut">
               <a:rPr lang="en-US" smtClean="0"/>
-              <a:t>4/24/18</a:t>
+              <a:t>5/1/18</a:t>
             </a:fld>
             <a:endParaRPr lang="en-US"/>
           </a:p>
@@ -763,7 +763,7 @@
           <a:p>
             <a:fld id="{B5AAD016-3922-B245-A041-AC660975EDB6}" type="datetimeFigureOut">
               <a:rPr lang="en-US" smtClean="0"/>
-              <a:t>4/24/18</a:t>
+              <a:t>5/1/18</a:t>
             </a:fld>
             <a:endParaRPr lang="en-US"/>
           </a:p>
@@ -1007,7 +1007,7 @@
           <a:p>
             <a:fld id="{B5AAD016-3922-B245-A041-AC660975EDB6}" type="datetimeFigureOut">
               <a:rPr lang="en-US" smtClean="0"/>
-              <a:t>4/24/18</a:t>
+              <a:t>5/1/18</a:t>
             </a:fld>
             <a:endParaRPr lang="en-US"/>
           </a:p>
@@ -1239,7 +1239,7 @@
           <a:p>
             <a:fld id="{B5AAD016-3922-B245-A041-AC660975EDB6}" type="datetimeFigureOut">
               <a:rPr lang="en-US" smtClean="0"/>
-              <a:t>4/24/18</a:t>
+              <a:t>5/1/18</a:t>
             </a:fld>
             <a:endParaRPr lang="en-US"/>
           </a:p>
@@ -1606,7 +1606,7 @@
           <a:p>
             <a:fld id="{B5AAD016-3922-B245-A041-AC660975EDB6}" type="datetimeFigureOut">
               <a:rPr lang="en-US" smtClean="0"/>
-              <a:t>4/24/18</a:t>
+              <a:t>5/1/18</a:t>
             </a:fld>
             <a:endParaRPr lang="en-US"/>
           </a:p>
@@ -1724,7 +1724,7 @@
           <a:p>
             <a:fld id="{B5AAD016-3922-B245-A041-AC660975EDB6}" type="datetimeFigureOut">
               <a:rPr lang="en-US" smtClean="0"/>
-              <a:t>4/24/18</a:t>
+              <a:t>5/1/18</a:t>
             </a:fld>
             <a:endParaRPr lang="en-US"/>
           </a:p>
@@ -1819,7 +1819,7 @@
           <a:p>
             <a:fld id="{B5AAD016-3922-B245-A041-AC660975EDB6}" type="datetimeFigureOut">
               <a:rPr lang="en-US" smtClean="0"/>
-              <a:t>4/24/18</a:t>
+              <a:t>5/1/18</a:t>
             </a:fld>
             <a:endParaRPr lang="en-US"/>
           </a:p>
@@ -2096,7 +2096,7 @@
           <a:p>
             <a:fld id="{B5AAD016-3922-B245-A041-AC660975EDB6}" type="datetimeFigureOut">
               <a:rPr lang="en-US" smtClean="0"/>
-              <a:t>4/24/18</a:t>
+              <a:t>5/1/18</a:t>
             </a:fld>
             <a:endParaRPr lang="en-US"/>
           </a:p>
@@ -2353,7 +2353,7 @@
           <a:p>
             <a:fld id="{B5AAD016-3922-B245-A041-AC660975EDB6}" type="datetimeFigureOut">
               <a:rPr lang="en-US" smtClean="0"/>
-              <a:t>4/24/18</a:t>
+              <a:t>5/1/18</a:t>
             </a:fld>
             <a:endParaRPr lang="en-US"/>
           </a:p>
@@ -2566,7 +2566,7 @@
           <a:p>
             <a:fld id="{B5AAD016-3922-B245-A041-AC660975EDB6}" type="datetimeFigureOut">
               <a:rPr lang="en-US" smtClean="0"/>
-              <a:t>4/24/18</a:t>
+              <a:t>5/1/18</a:t>
             </a:fld>
             <a:endParaRPr lang="en-US"/>
           </a:p>
@@ -3230,7 +3230,7 @@
                     <a:srgbClr val="002060"/>
                   </a:solidFill>
                 </a:rPr>
-                <a:t>0.5 </a:t>
+                <a:t>1 </a:t>
               </a:r>
               <a:r>
                 <a:rPr lang="en-US" sz="1200" i="1" dirty="0">

</xml_diff>